<commit_message>
improved placement of figures
</commit_message>
<xml_diff>
--- a/extra-figures/seek-figures.pptx
+++ b/extra-figures/seek-figures.pptx
@@ -9,15 +9,16 @@
     <p:sldId id="257" r:id="rId3"/>
     <p:sldId id="259" r:id="rId4"/>
     <p:sldId id="269" r:id="rId5"/>
-    <p:sldId id="260" r:id="rId6"/>
-    <p:sldId id="261" r:id="rId7"/>
-    <p:sldId id="262" r:id="rId8"/>
-    <p:sldId id="267" r:id="rId9"/>
-    <p:sldId id="268" r:id="rId10"/>
-    <p:sldId id="264" r:id="rId11"/>
-    <p:sldId id="263" r:id="rId12"/>
-    <p:sldId id="265" r:id="rId13"/>
-    <p:sldId id="266" r:id="rId14"/>
+    <p:sldId id="270" r:id="rId6"/>
+    <p:sldId id="260" r:id="rId7"/>
+    <p:sldId id="261" r:id="rId8"/>
+    <p:sldId id="262" r:id="rId9"/>
+    <p:sldId id="267" r:id="rId10"/>
+    <p:sldId id="268" r:id="rId11"/>
+    <p:sldId id="264" r:id="rId12"/>
+    <p:sldId id="263" r:id="rId13"/>
+    <p:sldId id="265" r:id="rId14"/>
+    <p:sldId id="266" r:id="rId15"/>
   </p:sldIdLst>
   <p:sldSz cx="9144000" cy="6858000" type="screen4x3"/>
   <p:notesSz cx="6858000" cy="9144000"/>
@@ -300,7 +301,7 @@
           <a:p>
             <a:fld id="{C3F75790-EE9F-844A-B9C8-E9391D35F304}" type="datetimeFigureOut">
               <a:rPr lang="en-US" smtClean="0"/>
-              <a:t>15-1-24</a:t>
+              <a:t>15-4-14</a:t>
             </a:fld>
             <a:endParaRPr lang="en-US"/>
           </a:p>
@@ -470,7 +471,7 @@
           <a:p>
             <a:fld id="{C3F75790-EE9F-844A-B9C8-E9391D35F304}" type="datetimeFigureOut">
               <a:rPr lang="en-US" smtClean="0"/>
-              <a:t>15-1-24</a:t>
+              <a:t>15-4-14</a:t>
             </a:fld>
             <a:endParaRPr lang="en-US"/>
           </a:p>
@@ -650,7 +651,7 @@
           <a:p>
             <a:fld id="{C3F75790-EE9F-844A-B9C8-E9391D35F304}" type="datetimeFigureOut">
               <a:rPr lang="en-US" smtClean="0"/>
-              <a:t>15-1-24</a:t>
+              <a:t>15-4-14</a:t>
             </a:fld>
             <a:endParaRPr lang="en-US"/>
           </a:p>
@@ -820,7 +821,7 @@
           <a:p>
             <a:fld id="{C3F75790-EE9F-844A-B9C8-E9391D35F304}" type="datetimeFigureOut">
               <a:rPr lang="en-US" smtClean="0"/>
-              <a:t>15-1-24</a:t>
+              <a:t>15-4-14</a:t>
             </a:fld>
             <a:endParaRPr lang="en-US"/>
           </a:p>
@@ -1066,7 +1067,7 @@
           <a:p>
             <a:fld id="{C3F75790-EE9F-844A-B9C8-E9391D35F304}" type="datetimeFigureOut">
               <a:rPr lang="en-US" smtClean="0"/>
-              <a:t>15-1-24</a:t>
+              <a:t>15-4-14</a:t>
             </a:fld>
             <a:endParaRPr lang="en-US"/>
           </a:p>
@@ -1354,7 +1355,7 @@
           <a:p>
             <a:fld id="{C3F75790-EE9F-844A-B9C8-E9391D35F304}" type="datetimeFigureOut">
               <a:rPr lang="en-US" smtClean="0"/>
-              <a:t>15-1-24</a:t>
+              <a:t>15-4-14</a:t>
             </a:fld>
             <a:endParaRPr lang="en-US"/>
           </a:p>
@@ -1781,7 +1782,7 @@
           <a:p>
             <a:fld id="{C3F75790-EE9F-844A-B9C8-E9391D35F304}" type="datetimeFigureOut">
               <a:rPr lang="en-US" smtClean="0"/>
-              <a:t>15-1-24</a:t>
+              <a:t>15-4-14</a:t>
             </a:fld>
             <a:endParaRPr lang="en-US"/>
           </a:p>
@@ -1899,7 +1900,7 @@
           <a:p>
             <a:fld id="{C3F75790-EE9F-844A-B9C8-E9391D35F304}" type="datetimeFigureOut">
               <a:rPr lang="en-US" smtClean="0"/>
-              <a:t>15-1-24</a:t>
+              <a:t>15-4-14</a:t>
             </a:fld>
             <a:endParaRPr lang="en-US"/>
           </a:p>
@@ -1994,7 +1995,7 @@
           <a:p>
             <a:fld id="{C3F75790-EE9F-844A-B9C8-E9391D35F304}" type="datetimeFigureOut">
               <a:rPr lang="en-US" smtClean="0"/>
-              <a:t>15-1-24</a:t>
+              <a:t>15-4-14</a:t>
             </a:fld>
             <a:endParaRPr lang="en-US"/>
           </a:p>
@@ -2271,7 +2272,7 @@
           <a:p>
             <a:fld id="{C3F75790-EE9F-844A-B9C8-E9391D35F304}" type="datetimeFigureOut">
               <a:rPr lang="en-US" smtClean="0"/>
-              <a:t>15-1-24</a:t>
+              <a:t>15-4-14</a:t>
             </a:fld>
             <a:endParaRPr lang="en-US"/>
           </a:p>
@@ -2524,7 +2525,7 @@
           <a:p>
             <a:fld id="{C3F75790-EE9F-844A-B9C8-E9391D35F304}" type="datetimeFigureOut">
               <a:rPr lang="en-US" smtClean="0"/>
-              <a:t>15-1-24</a:t>
+              <a:t>15-4-14</a:t>
             </a:fld>
             <a:endParaRPr lang="en-US"/>
           </a:p>
@@ -2737,7 +2738,7 @@
           <a:p>
             <a:fld id="{C3F75790-EE9F-844A-B9C8-E9391D35F304}" type="datetimeFigureOut">
               <a:rPr lang="en-US" smtClean="0"/>
-              <a:t>15-1-24</a:t>
+              <a:t>15-4-14</a:t>
             </a:fld>
             <a:endParaRPr lang="en-US"/>
           </a:p>
@@ -3378,7 +3379,7 @@
       </p:grpSpPr>
       <p:pic>
         <p:nvPicPr>
-          <p:cNvPr id="2" name="Picture 1" descr="seek-histogram.png"/>
+          <p:cNvPr id="4" name="Picture 3" descr="seek-scatter2.png"/>
           <p:cNvPicPr>
             <a:picLocks noChangeAspect="1"/>
           </p:cNvPicPr>
@@ -3398,8 +3399,8 @@
         </p:blipFill>
         <p:spPr>
           <a:xfrm>
-            <a:off x="1177572" y="982115"/>
-            <a:ext cx="7449759" cy="2851861"/>
+            <a:off x="1177572" y="892156"/>
+            <a:ext cx="7370116" cy="2941820"/>
           </a:xfrm>
           <a:prstGeom prst="rect">
             <a:avLst/>
@@ -3415,25 +3416,27 @@
         <p:spPr>
           <a:xfrm>
             <a:off x="3052749" y="3833976"/>
-            <a:ext cx="1619992" cy="264592"/>
+            <a:ext cx="2034948" cy="264592"/>
           </a:xfrm>
           <a:prstGeom prst="wedgeRoundRectCallout">
             <a:avLst>
-              <a:gd name="adj1" fmla="val -23997"/>
-              <a:gd name="adj2" fmla="val -136354"/>
+              <a:gd name="adj1" fmla="val -23969"/>
+              <a:gd name="adj2" fmla="val -177080"/>
               <a:gd name="adj3" fmla="val 16667"/>
             </a:avLst>
           </a:prstGeom>
         </p:spPr>
         <p:style>
-          <a:lnRef idx="1">
-            <a:schemeClr val="accent1"/>
+          <a:lnRef idx="2">
+            <a:schemeClr val="dk1">
+              <a:shade val="50000"/>
+            </a:schemeClr>
           </a:lnRef>
-          <a:fillRef idx="3">
-            <a:schemeClr val="accent1"/>
+          <a:fillRef idx="1">
+            <a:schemeClr val="dk1"/>
           </a:fillRef>
-          <a:effectRef idx="2">
-            <a:schemeClr val="accent1"/>
+          <a:effectRef idx="0">
+            <a:schemeClr val="dk1"/>
           </a:effectRef>
           <a:fontRef idx="minor">
             <a:schemeClr val="lt1"/>
@@ -3454,7 +3457,7 @@
             </a:r>
             <a:r>
               <a:rPr lang="en-US" altLang="zh-CN" sz="1200" dirty="0" smtClean="0"/>
-              <a:t>1 (t=146)</a:t>
+              <a:t>1 (146 seconds)</a:t>
             </a:r>
             <a:endParaRPr lang="en-US" sz="1200" dirty="0"/>
           </a:p>
@@ -3468,26 +3471,28 @@
         </p:nvSpPr>
         <p:spPr>
           <a:xfrm>
-            <a:off x="5563179" y="3823213"/>
-            <a:ext cx="1725820" cy="259961"/>
+            <a:off x="5780423" y="3838607"/>
+            <a:ext cx="2008910" cy="259961"/>
           </a:xfrm>
           <a:prstGeom prst="wedgeRoundRectCallout">
             <a:avLst>
-              <a:gd name="adj1" fmla="val -24807"/>
-              <a:gd name="adj2" fmla="val -139685"/>
+              <a:gd name="adj1" fmla="val -21435"/>
+              <a:gd name="adj2" fmla="val -181135"/>
               <a:gd name="adj3" fmla="val 16667"/>
             </a:avLst>
           </a:prstGeom>
         </p:spPr>
         <p:style>
-          <a:lnRef idx="1">
-            <a:schemeClr val="accent1"/>
+          <a:lnRef idx="2">
+            <a:schemeClr val="dk1">
+              <a:shade val="50000"/>
+            </a:schemeClr>
           </a:lnRef>
-          <a:fillRef idx="3">
-            <a:schemeClr val="accent1"/>
+          <a:fillRef idx="1">
+            <a:schemeClr val="dk1"/>
           </a:fillRef>
-          <a:effectRef idx="2">
-            <a:schemeClr val="accent1"/>
+          <a:effectRef idx="0">
+            <a:schemeClr val="dk1"/>
           </a:effectRef>
           <a:fontRef idx="minor">
             <a:schemeClr val="lt1"/>
@@ -3508,7 +3513,7 @@
             </a:r>
             <a:r>
               <a:rPr lang="en-US" altLang="zh-CN" sz="1200" dirty="0" smtClean="0"/>
-              <a:t>2 (t=376)</a:t>
+              <a:t>2 (376 seconds)</a:t>
             </a:r>
             <a:endParaRPr lang="en-US" sz="1200" dirty="0"/>
           </a:p>
@@ -3522,26 +3527,28 @@
         </p:nvSpPr>
         <p:spPr>
           <a:xfrm>
-            <a:off x="436631" y="2700615"/>
-            <a:ext cx="757082" cy="580315"/>
+            <a:off x="356364" y="2647758"/>
+            <a:ext cx="837349" cy="762000"/>
           </a:xfrm>
           <a:prstGeom prst="wedgeRoundRectCallout">
             <a:avLst>
-              <a:gd name="adj1" fmla="val 89938"/>
-              <a:gd name="adj2" fmla="val -25266"/>
+              <a:gd name="adj1" fmla="val 124171"/>
+              <a:gd name="adj2" fmla="val -26592"/>
               <a:gd name="adj3" fmla="val 16667"/>
             </a:avLst>
           </a:prstGeom>
         </p:spPr>
         <p:style>
-          <a:lnRef idx="1">
-            <a:schemeClr val="accent1"/>
+          <a:lnRef idx="2">
+            <a:schemeClr val="dk1">
+              <a:shade val="50000"/>
+            </a:schemeClr>
           </a:lnRef>
-          <a:fillRef idx="3">
-            <a:schemeClr val="accent1"/>
+          <a:fillRef idx="1">
+            <a:schemeClr val="dk1"/>
           </a:fillRef>
-          <a:effectRef idx="2">
-            <a:schemeClr val="accent1"/>
+          <a:effectRef idx="0">
+            <a:schemeClr val="dk1"/>
           </a:effectRef>
           <a:fontRef idx="minor">
             <a:schemeClr val="lt1"/>
@@ -3562,7 +3569,7 @@
             </a:r>
             <a:r>
               <a:rPr lang="en-US" altLang="zh-CN" sz="1200" dirty="0" smtClean="0"/>
-              <a:t>1 (t=146)</a:t>
+              <a:t>1 (146 seconds)</a:t>
             </a:r>
             <a:endParaRPr lang="en-US" sz="1200" dirty="0"/>
           </a:p>
@@ -3576,26 +3583,28 @@
         </p:nvSpPr>
         <p:spPr>
           <a:xfrm>
-            <a:off x="436631" y="1680673"/>
-            <a:ext cx="757082" cy="582599"/>
+            <a:off x="356364" y="1631758"/>
+            <a:ext cx="837349" cy="738909"/>
           </a:xfrm>
           <a:prstGeom prst="wedgeRoundRectCallout">
             <a:avLst>
-              <a:gd name="adj1" fmla="val 84737"/>
-              <a:gd name="adj2" fmla="val -23126"/>
+              <a:gd name="adj1" fmla="val 122019"/>
+              <a:gd name="adj2" fmla="val -28411"/>
               <a:gd name="adj3" fmla="val 16667"/>
             </a:avLst>
           </a:prstGeom>
         </p:spPr>
         <p:style>
-          <a:lnRef idx="1">
-            <a:schemeClr val="accent1"/>
+          <a:lnRef idx="2">
+            <a:schemeClr val="dk1">
+              <a:shade val="50000"/>
+            </a:schemeClr>
           </a:lnRef>
-          <a:fillRef idx="3">
-            <a:schemeClr val="accent1"/>
+          <a:fillRef idx="1">
+            <a:schemeClr val="dk1"/>
           </a:fillRef>
-          <a:effectRef idx="2">
-            <a:schemeClr val="accent1"/>
+          <a:effectRef idx="0">
+            <a:schemeClr val="dk1"/>
           </a:effectRef>
           <a:fontRef idx="minor">
             <a:schemeClr val="lt1"/>
@@ -3616,7 +3625,7 @@
             </a:r>
             <a:r>
               <a:rPr lang="en-US" altLang="zh-CN" sz="1200" dirty="0" smtClean="0"/>
-              <a:t>2 (t=376)</a:t>
+              <a:t>2 (376 seconds)</a:t>
             </a:r>
             <a:endParaRPr lang="en-US" sz="1200" dirty="0"/>
           </a:p>
@@ -3630,7 +3639,7 @@
         </p:nvSpPr>
         <p:spPr>
           <a:xfrm rot="16200000">
-            <a:off x="-1424574" y="2455260"/>
+            <a:off x="-1486150" y="2370593"/>
             <a:ext cx="3423416" cy="261610"/>
           </a:xfrm>
           <a:prstGeom prst="rect">
@@ -3660,7 +3669,7 @@
         </p:nvSpPr>
         <p:spPr>
           <a:xfrm>
-            <a:off x="2773009" y="4120744"/>
+            <a:off x="2919252" y="4128441"/>
             <a:ext cx="3088269" cy="261610"/>
           </a:xfrm>
           <a:prstGeom prst="rect">
@@ -3690,8 +3699,8 @@
         </p:nvSpPr>
         <p:spPr>
           <a:xfrm>
-            <a:off x="646015" y="4617885"/>
-            <a:ext cx="7836556" cy="1569660"/>
+            <a:off x="1701031" y="566575"/>
+            <a:ext cx="6603999" cy="338554"/>
           </a:xfrm>
           <a:prstGeom prst="rect">
             <a:avLst/>
@@ -3705,17 +3714,17 @@
           <a:lstStyle/>
           <a:p>
             <a:r>
-              <a:rPr lang="en-US" sz="1200" dirty="0" smtClean="0"/>
-              <a:t>Seeks sources and destinations within a Coursera lecture video (Machine Learning, lecture 13), shown as a scatter plot on the left, and a 2D histogram on the right. A point at coordinate (x,y) represents a seek event starting from time x, going to time y in the video. Points above the diagonal are seeks going forward, and points below the diagonal are seeks going back. We see there are many seeks from the start of the video to the first in-video quiz, as shown at point (0,146); there are also many seeks from immediately after the first in-video quiz to the second in-video quiz, as shown at point (146,376). As we can see at lines y=146 and y=376, users do not tend to skip past the in-video quizzes to the next subsection, and they do not tend to skip back to previous subsections. If we look at backwards seeks (points below the diagonal), they mostly originate at the in-video quizzes (x=146 and x=376), and go to points in the immediately preceding section.</a:t>
-            </a:r>
-            <a:endParaRPr lang="en-US" sz="1200" dirty="0"/>
+              <a:rPr lang="en-US" sz="1600" b="1" dirty="0" smtClean="0"/>
+              <a:t>Scatter Plot of Seek Sources and Destinations in ML4 Lecture 13 on Coursera</a:t>
+            </a:r>
+            <a:endParaRPr lang="en-US" sz="1600" b="1" dirty="0"/>
           </a:p>
         </p:txBody>
       </p:sp>
     </p:spTree>
     <p:extLst>
       <p:ext uri="{BB962C8B-B14F-4D97-AF65-F5344CB8AC3E}">
-        <p14:creationId xmlns:p14="http://schemas.microsoft.com/office/powerpoint/2010/main" val="3229729515"/>
+        <p14:creationId xmlns:p14="http://schemas.microsoft.com/office/powerpoint/2010/main" val="3774800565"/>
       </p:ext>
     </p:extLst>
   </p:cSld>
@@ -3751,62 +3760,260 @@
       </p:grpSpPr>
       <p:pic>
         <p:nvPicPr>
-          <p:cNvPr id="23" name="Picture 22"/>
+          <p:cNvPr id="2" name="Picture 1" descr="seek-histogram.png"/>
           <p:cNvPicPr>
             <a:picLocks noChangeAspect="1"/>
           </p:cNvPicPr>
           <p:nvPr/>
         </p:nvPicPr>
         <p:blipFill>
-          <a:blip r:embed="rId2"/>
+          <a:blip r:embed="rId2">
+            <a:extLst>
+              <a:ext uri="{28A0092B-C50C-407E-A947-70E740481C1C}">
+                <a14:useLocalDpi xmlns:a14="http://schemas.microsoft.com/office/drawing/2010/main" val="0"/>
+              </a:ext>
+            </a:extLst>
+          </a:blip>
           <a:stretch>
             <a:fillRect/>
           </a:stretch>
         </p:blipFill>
         <p:spPr>
           <a:xfrm>
-            <a:off x="1009713" y="38484"/>
-            <a:ext cx="6494833" cy="2786303"/>
+            <a:off x="1177572" y="982115"/>
+            <a:ext cx="7449759" cy="2851861"/>
           </a:xfrm>
           <a:prstGeom prst="rect">
             <a:avLst/>
           </a:prstGeom>
         </p:spPr>
       </p:pic>
-      <p:pic>
-        <p:nvPicPr>
-          <p:cNvPr id="22" name="Picture 21"/>
-          <p:cNvPicPr>
-            <a:picLocks noChangeAspect="1"/>
-          </p:cNvPicPr>
-          <p:nvPr/>
-        </p:nvPicPr>
-        <p:blipFill>
-          <a:blip r:embed="rId3"/>
-          <a:stretch>
-            <a:fillRect/>
-          </a:stretch>
-        </p:blipFill>
-        <p:spPr>
-          <a:xfrm>
-            <a:off x="1006505" y="4144872"/>
-            <a:ext cx="6498041" cy="2704275"/>
-          </a:xfrm>
-          <a:prstGeom prst="rect">
-            <a:avLst/>
-          </a:prstGeom>
-        </p:spPr>
-      </p:pic>
-      <p:sp>
-        <p:nvSpPr>
-          <p:cNvPr id="11" name="TextBox 10"/>
+      <p:sp>
+        <p:nvSpPr>
+          <p:cNvPr id="5" name="Rounded Rectangular Callout 4"/>
+          <p:cNvSpPr/>
+          <p:nvPr/>
+        </p:nvSpPr>
+        <p:spPr>
+          <a:xfrm>
+            <a:off x="3052749" y="3833976"/>
+            <a:ext cx="1619992" cy="264592"/>
+          </a:xfrm>
+          <a:prstGeom prst="wedgeRoundRectCallout">
+            <a:avLst>
+              <a:gd name="adj1" fmla="val -23997"/>
+              <a:gd name="adj2" fmla="val -136354"/>
+              <a:gd name="adj3" fmla="val 16667"/>
+            </a:avLst>
+          </a:prstGeom>
+        </p:spPr>
+        <p:style>
+          <a:lnRef idx="1">
+            <a:schemeClr val="accent1"/>
+          </a:lnRef>
+          <a:fillRef idx="3">
+            <a:schemeClr val="accent1"/>
+          </a:fillRef>
+          <a:effectRef idx="2">
+            <a:schemeClr val="accent1"/>
+          </a:effectRef>
+          <a:fontRef idx="minor">
+            <a:schemeClr val="lt1"/>
+          </a:fontRef>
+        </p:style>
+        <p:txBody>
+          <a:bodyPr rtlCol="0" anchor="ctr"/>
+          <a:lstStyle/>
+          <a:p>
+            <a:pPr algn="ctr"/>
+            <a:r>
+              <a:rPr lang="en-US" altLang="zh-CN" sz="1200" dirty="0" smtClean="0"/>
+              <a:t>In-video quiz</a:t>
+            </a:r>
+            <a:r>
+              <a:rPr lang="zh-CN" altLang="en-US" sz="1200" dirty="0" smtClean="0"/>
+              <a:t> </a:t>
+            </a:r>
+            <a:r>
+              <a:rPr lang="en-US" altLang="zh-CN" sz="1200" dirty="0" smtClean="0"/>
+              <a:t>1 (t=146)</a:t>
+            </a:r>
+            <a:endParaRPr lang="en-US" sz="1200" dirty="0"/>
+          </a:p>
+        </p:txBody>
+      </p:sp>
+      <p:sp>
+        <p:nvSpPr>
+          <p:cNvPr id="6" name="Rounded Rectangular Callout 5"/>
+          <p:cNvSpPr/>
+          <p:nvPr/>
+        </p:nvSpPr>
+        <p:spPr>
+          <a:xfrm>
+            <a:off x="5563179" y="3823213"/>
+            <a:ext cx="1725820" cy="259961"/>
+          </a:xfrm>
+          <a:prstGeom prst="wedgeRoundRectCallout">
+            <a:avLst>
+              <a:gd name="adj1" fmla="val -24807"/>
+              <a:gd name="adj2" fmla="val -139685"/>
+              <a:gd name="adj3" fmla="val 16667"/>
+            </a:avLst>
+          </a:prstGeom>
+        </p:spPr>
+        <p:style>
+          <a:lnRef idx="1">
+            <a:schemeClr val="accent1"/>
+          </a:lnRef>
+          <a:fillRef idx="3">
+            <a:schemeClr val="accent1"/>
+          </a:fillRef>
+          <a:effectRef idx="2">
+            <a:schemeClr val="accent1"/>
+          </a:effectRef>
+          <a:fontRef idx="minor">
+            <a:schemeClr val="lt1"/>
+          </a:fontRef>
+        </p:style>
+        <p:txBody>
+          <a:bodyPr rtlCol="0" anchor="ctr"/>
+          <a:lstStyle/>
+          <a:p>
+            <a:pPr algn="ctr"/>
+            <a:r>
+              <a:rPr lang="en-US" altLang="zh-CN" sz="1200" dirty="0" smtClean="0"/>
+              <a:t>In-video quiz</a:t>
+            </a:r>
+            <a:r>
+              <a:rPr lang="zh-CN" altLang="en-US" sz="1200" dirty="0" smtClean="0"/>
+              <a:t> </a:t>
+            </a:r>
+            <a:r>
+              <a:rPr lang="en-US" altLang="zh-CN" sz="1200" dirty="0" smtClean="0"/>
+              <a:t>2 (t=376)</a:t>
+            </a:r>
+            <a:endParaRPr lang="en-US" sz="1200" dirty="0"/>
+          </a:p>
+        </p:txBody>
+      </p:sp>
+      <p:sp>
+        <p:nvSpPr>
+          <p:cNvPr id="7" name="Rounded Rectangular Callout 6"/>
+          <p:cNvSpPr/>
+          <p:nvPr/>
+        </p:nvSpPr>
+        <p:spPr>
+          <a:xfrm>
+            <a:off x="436631" y="2700615"/>
+            <a:ext cx="757082" cy="580315"/>
+          </a:xfrm>
+          <a:prstGeom prst="wedgeRoundRectCallout">
+            <a:avLst>
+              <a:gd name="adj1" fmla="val 89938"/>
+              <a:gd name="adj2" fmla="val -25266"/>
+              <a:gd name="adj3" fmla="val 16667"/>
+            </a:avLst>
+          </a:prstGeom>
+        </p:spPr>
+        <p:style>
+          <a:lnRef idx="1">
+            <a:schemeClr val="accent1"/>
+          </a:lnRef>
+          <a:fillRef idx="3">
+            <a:schemeClr val="accent1"/>
+          </a:fillRef>
+          <a:effectRef idx="2">
+            <a:schemeClr val="accent1"/>
+          </a:effectRef>
+          <a:fontRef idx="minor">
+            <a:schemeClr val="lt1"/>
+          </a:fontRef>
+        </p:style>
+        <p:txBody>
+          <a:bodyPr rtlCol="0" anchor="ctr"/>
+          <a:lstStyle/>
+          <a:p>
+            <a:pPr algn="ctr"/>
+            <a:r>
+              <a:rPr lang="en-US" altLang="zh-CN" sz="1200" dirty="0" smtClean="0"/>
+              <a:t>In-video quiz</a:t>
+            </a:r>
+            <a:r>
+              <a:rPr lang="zh-CN" altLang="en-US" sz="1200" dirty="0" smtClean="0"/>
+              <a:t> </a:t>
+            </a:r>
+            <a:r>
+              <a:rPr lang="en-US" altLang="zh-CN" sz="1200" dirty="0" smtClean="0"/>
+              <a:t>1 (t=146)</a:t>
+            </a:r>
+            <a:endParaRPr lang="en-US" sz="1200" dirty="0"/>
+          </a:p>
+        </p:txBody>
+      </p:sp>
+      <p:sp>
+        <p:nvSpPr>
+          <p:cNvPr id="8" name="Rounded Rectangular Callout 7"/>
+          <p:cNvSpPr/>
+          <p:nvPr/>
+        </p:nvSpPr>
+        <p:spPr>
+          <a:xfrm>
+            <a:off x="436631" y="1680673"/>
+            <a:ext cx="757082" cy="582599"/>
+          </a:xfrm>
+          <a:prstGeom prst="wedgeRoundRectCallout">
+            <a:avLst>
+              <a:gd name="adj1" fmla="val 84737"/>
+              <a:gd name="adj2" fmla="val -23126"/>
+              <a:gd name="adj3" fmla="val 16667"/>
+            </a:avLst>
+          </a:prstGeom>
+        </p:spPr>
+        <p:style>
+          <a:lnRef idx="1">
+            <a:schemeClr val="accent1"/>
+          </a:lnRef>
+          <a:fillRef idx="3">
+            <a:schemeClr val="accent1"/>
+          </a:fillRef>
+          <a:effectRef idx="2">
+            <a:schemeClr val="accent1"/>
+          </a:effectRef>
+          <a:fontRef idx="minor">
+            <a:schemeClr val="lt1"/>
+          </a:fontRef>
+        </p:style>
+        <p:txBody>
+          <a:bodyPr rtlCol="0" anchor="ctr"/>
+          <a:lstStyle/>
+          <a:p>
+            <a:pPr algn="ctr"/>
+            <a:r>
+              <a:rPr lang="en-US" altLang="zh-CN" sz="1200" dirty="0" smtClean="0"/>
+              <a:t>In-video quiz</a:t>
+            </a:r>
+            <a:r>
+              <a:rPr lang="zh-CN" altLang="en-US" sz="1200" dirty="0" smtClean="0"/>
+              <a:t> </a:t>
+            </a:r>
+            <a:r>
+              <a:rPr lang="en-US" altLang="zh-CN" sz="1200" dirty="0" smtClean="0"/>
+              <a:t>2 (t=376)</a:t>
+            </a:r>
+            <a:endParaRPr lang="en-US" sz="1200" dirty="0"/>
+          </a:p>
+        </p:txBody>
+      </p:sp>
+      <p:sp>
+        <p:nvSpPr>
+          <p:cNvPr id="9" name="TextBox 8"/>
           <p:cNvSpPr txBox="1"/>
           <p:nvPr/>
         </p:nvSpPr>
         <p:spPr>
-          <a:xfrm>
-            <a:off x="1006505" y="2866333"/>
-            <a:ext cx="6498041" cy="1323439"/>
+          <a:xfrm rot="16200000">
+            <a:off x="-1424574" y="2455260"/>
+            <a:ext cx="3423416" cy="261610"/>
           </a:xfrm>
           <a:prstGeom prst="rect">
             <a:avLst/>
@@ -3820,23 +4027,23 @@
           <a:lstStyle/>
           <a:p>
             <a:r>
-              <a:rPr lang="en-US" sz="1000" dirty="0" smtClean="0"/>
-              <a:t>Seeks sources and destinations within a Coursera lecture video (Machine Learning, lecture 13), shown as a scatter plot on the top, and a 2D histogram on the bottom. A point at coordinate (x,y) represents a seek event starting from time x, going to time y in the video. Points above the diagonal are seeks going forward, and points below the diagonal are seeks going back. We see there are many seeks from the start of the video to the first in-video quiz, as shown at point (0,146); there are also many seeks from immediately after the first in-video quiz to the second in-video quiz, as shown at point (146,376). As we can see at lines y=146 and y=376, users do not tend to skip past the in-video quizzes to the next subsection, and they do not tend to skip back to previous subsections. If we look at backwards seeks (points below the diagonal), they mostly originate at the in-video quizzes (x=146 and x=376), and go to points in the preceding section.</a:t>
-            </a:r>
-            <a:endParaRPr lang="en-US" sz="1000" dirty="0"/>
-          </a:p>
-        </p:txBody>
-      </p:sp>
-      <p:sp>
-        <p:nvSpPr>
-          <p:cNvPr id="24" name="TextBox 23"/>
+              <a:rPr lang="en-US" sz="1100" dirty="0" smtClean="0"/>
+              <a:t>Destination of seek event (position in video, in seconds)</a:t>
+            </a:r>
+            <a:endParaRPr lang="en-US" sz="1100" dirty="0"/>
+          </a:p>
+        </p:txBody>
+      </p:sp>
+      <p:sp>
+        <p:nvSpPr>
+          <p:cNvPr id="10" name="TextBox 9"/>
           <p:cNvSpPr txBox="1"/>
           <p:nvPr/>
         </p:nvSpPr>
         <p:spPr>
           <a:xfrm>
-            <a:off x="1223819" y="-61401"/>
-            <a:ext cx="6365394" cy="292388"/>
+            <a:off x="2773009" y="4120744"/>
+            <a:ext cx="3088269" cy="261610"/>
           </a:xfrm>
           <a:prstGeom prst="rect">
             <a:avLst/>
@@ -3850,17 +4057,47 @@
           <a:lstStyle/>
           <a:p>
             <a:r>
-              <a:rPr lang="en-US" sz="1300" b="1" dirty="0" smtClean="0"/>
-              <a:t>Scatter Plot + Histogram of Seek Sources and Destinations in ML4 Lecture 13 on Coursera</a:t>
-            </a:r>
-            <a:endParaRPr lang="en-US" sz="1300" b="1" dirty="0"/>
+              <a:rPr lang="en-US" sz="1100" dirty="0" smtClean="0"/>
+              <a:t>Start of seek event (position in video, in seconds)</a:t>
+            </a:r>
+            <a:endParaRPr lang="en-US" sz="1100" dirty="0"/>
+          </a:p>
+        </p:txBody>
+      </p:sp>
+      <p:sp>
+        <p:nvSpPr>
+          <p:cNvPr id="11" name="TextBox 10"/>
+          <p:cNvSpPr txBox="1"/>
+          <p:nvPr/>
+        </p:nvSpPr>
+        <p:spPr>
+          <a:xfrm>
+            <a:off x="646015" y="4617885"/>
+            <a:ext cx="7836556" cy="1569660"/>
+          </a:xfrm>
+          <a:prstGeom prst="rect">
+            <a:avLst/>
+          </a:prstGeom>
+          <a:noFill/>
+        </p:spPr>
+        <p:txBody>
+          <a:bodyPr wrap="square" rtlCol="0">
+            <a:spAutoFit/>
+          </a:bodyPr>
+          <a:lstStyle/>
+          <a:p>
+            <a:r>
+              <a:rPr lang="en-US" sz="1200" dirty="0" smtClean="0"/>
+              <a:t>Seeks sources and destinations within a Coursera lecture video (Machine Learning, lecture 13), shown as a scatter plot on the left, and a 2D histogram on the right. A point at coordinate (x,y) represents a seek event starting from time x, going to time y in the video. Points above the diagonal are seeks going forward, and points below the diagonal are seeks going back. We see there are many seeks from the start of the video to the first in-video quiz, as shown at point (0,146); there are also many seeks from immediately after the first in-video quiz to the second in-video quiz, as shown at point (146,376). As we can see at lines y=146 and y=376, users do not tend to skip past the in-video quizzes to the next subsection, and they do not tend to skip back to previous subsections. If we look at backwards seeks (points below the diagonal), they mostly originate at the in-video quizzes (x=146 and x=376), and go to points in the immediately preceding section.</a:t>
+            </a:r>
+            <a:endParaRPr lang="en-US" sz="1200" dirty="0"/>
           </a:p>
         </p:txBody>
       </p:sp>
     </p:spTree>
     <p:extLst>
       <p:ext uri="{BB962C8B-B14F-4D97-AF65-F5344CB8AC3E}">
-        <p14:creationId xmlns:p14="http://schemas.microsoft.com/office/powerpoint/2010/main" val="3906969902"/>
+        <p14:creationId xmlns:p14="http://schemas.microsoft.com/office/powerpoint/2010/main" val="3229729515"/>
       </p:ext>
     </p:extLst>
   </p:cSld>
@@ -3896,6 +4133,151 @@
       </p:grpSpPr>
       <p:pic>
         <p:nvPicPr>
+          <p:cNvPr id="23" name="Picture 22"/>
+          <p:cNvPicPr>
+            <a:picLocks noChangeAspect="1"/>
+          </p:cNvPicPr>
+          <p:nvPr/>
+        </p:nvPicPr>
+        <p:blipFill>
+          <a:blip r:embed="rId2"/>
+          <a:stretch>
+            <a:fillRect/>
+          </a:stretch>
+        </p:blipFill>
+        <p:spPr>
+          <a:xfrm>
+            <a:off x="1009713" y="38484"/>
+            <a:ext cx="6494833" cy="2786303"/>
+          </a:xfrm>
+          <a:prstGeom prst="rect">
+            <a:avLst/>
+          </a:prstGeom>
+        </p:spPr>
+      </p:pic>
+      <p:pic>
+        <p:nvPicPr>
+          <p:cNvPr id="22" name="Picture 21"/>
+          <p:cNvPicPr>
+            <a:picLocks noChangeAspect="1"/>
+          </p:cNvPicPr>
+          <p:nvPr/>
+        </p:nvPicPr>
+        <p:blipFill>
+          <a:blip r:embed="rId3"/>
+          <a:stretch>
+            <a:fillRect/>
+          </a:stretch>
+        </p:blipFill>
+        <p:spPr>
+          <a:xfrm>
+            <a:off x="1006505" y="4144872"/>
+            <a:ext cx="6498041" cy="2704275"/>
+          </a:xfrm>
+          <a:prstGeom prst="rect">
+            <a:avLst/>
+          </a:prstGeom>
+        </p:spPr>
+      </p:pic>
+      <p:sp>
+        <p:nvSpPr>
+          <p:cNvPr id="11" name="TextBox 10"/>
+          <p:cNvSpPr txBox="1"/>
+          <p:nvPr/>
+        </p:nvSpPr>
+        <p:spPr>
+          <a:xfrm>
+            <a:off x="1006505" y="2866333"/>
+            <a:ext cx="6498041" cy="1323439"/>
+          </a:xfrm>
+          <a:prstGeom prst="rect">
+            <a:avLst/>
+          </a:prstGeom>
+          <a:noFill/>
+        </p:spPr>
+        <p:txBody>
+          <a:bodyPr wrap="square" rtlCol="0">
+            <a:spAutoFit/>
+          </a:bodyPr>
+          <a:lstStyle/>
+          <a:p>
+            <a:r>
+              <a:rPr lang="en-US" sz="1000" dirty="0" smtClean="0"/>
+              <a:t>Seeks sources and destinations within a Coursera lecture video (Machine Learning, lecture 13), shown as a scatter plot on the top, and a 2D histogram on the bottom. A point at coordinate (x,y) represents a seek event starting from time x, going to time y in the video. Points above the diagonal are seeks going forward, and points below the diagonal are seeks going back. We see there are many seeks from the start of the video to the first in-video quiz, as shown at point (0,146); there are also many seeks from immediately after the first in-video quiz to the second in-video quiz, as shown at point (146,376). As we can see at lines y=146 and y=376, users do not tend to skip past the in-video quizzes to the next subsection, and they do not tend to skip back to previous subsections. If we look at backwards seeks (points below the diagonal), they mostly originate at the in-video quizzes (x=146 and x=376), and go to points in the preceding section.</a:t>
+            </a:r>
+            <a:endParaRPr lang="en-US" sz="1000" dirty="0"/>
+          </a:p>
+        </p:txBody>
+      </p:sp>
+      <p:sp>
+        <p:nvSpPr>
+          <p:cNvPr id="24" name="TextBox 23"/>
+          <p:cNvSpPr txBox="1"/>
+          <p:nvPr/>
+        </p:nvSpPr>
+        <p:spPr>
+          <a:xfrm>
+            <a:off x="1223819" y="-61401"/>
+            <a:ext cx="6365394" cy="292388"/>
+          </a:xfrm>
+          <a:prstGeom prst="rect">
+            <a:avLst/>
+          </a:prstGeom>
+          <a:noFill/>
+        </p:spPr>
+        <p:txBody>
+          <a:bodyPr wrap="square" rtlCol="0">
+            <a:spAutoFit/>
+          </a:bodyPr>
+          <a:lstStyle/>
+          <a:p>
+            <a:r>
+              <a:rPr lang="en-US" sz="1300" b="1" dirty="0" smtClean="0"/>
+              <a:t>Scatter Plot + Histogram of Seek Sources and Destinations in ML4 Lecture 13 on Coursera</a:t>
+            </a:r>
+            <a:endParaRPr lang="en-US" sz="1300" b="1" dirty="0"/>
+          </a:p>
+        </p:txBody>
+      </p:sp>
+    </p:spTree>
+    <p:extLst>
+      <p:ext uri="{BB962C8B-B14F-4D97-AF65-F5344CB8AC3E}">
+        <p14:creationId xmlns:p14="http://schemas.microsoft.com/office/powerpoint/2010/main" val="3906969902"/>
+      </p:ext>
+    </p:extLst>
+  </p:cSld>
+  <p:clrMapOvr>
+    <a:masterClrMapping/>
+  </p:clrMapOvr>
+  <p:timing>
+    <p:tnLst>
+      <p:par>
+        <p:cTn xmlns:p14="http://schemas.microsoft.com/office/powerpoint/2010/main" id="1" dur="indefinite" restart="never" nodeType="tmRoot"/>
+      </p:par>
+    </p:tnLst>
+  </p:timing>
+</p:sld>
+</file>
+
+<file path=ppt/slides/slide13.xml><?xml version="1.0" encoding="utf-8"?>
+<p:sld xmlns:a="http://schemas.openxmlformats.org/drawingml/2006/main" xmlns:r="http://schemas.openxmlformats.org/officeDocument/2006/relationships" xmlns:p="http://schemas.openxmlformats.org/presentationml/2006/main">
+  <p:cSld>
+    <p:spTree>
+      <p:nvGrpSpPr>
+        <p:cNvPr id="1" name=""/>
+        <p:cNvGrpSpPr/>
+        <p:nvPr/>
+      </p:nvGrpSpPr>
+      <p:grpSpPr>
+        <a:xfrm>
+          <a:off x="0" y="0"/>
+          <a:ext cx="0" cy="0"/>
+          <a:chOff x="0" y="0"/>
+          <a:chExt cx="0" cy="0"/>
+        </a:xfrm>
+      </p:grpSpPr>
+      <p:pic>
+        <p:nvPicPr>
           <p:cNvPr id="4" name="Picture 3" descr="ErfGqaTAIH5ICQSUT50iKq3K6unkBVpVB2ywyKgJ2VA.png"/>
           <p:cNvPicPr>
             <a:picLocks noChangeAspect="1"/>
@@ -4107,7 +4489,7 @@
 </p:sld>
 </file>
 
-<file path=ppt/slides/slide13.xml><?xml version="1.0" encoding="utf-8"?>
+<file path=ppt/slides/slide14.xml><?xml version="1.0" encoding="utf-8"?>
 <p:sld xmlns:a="http://schemas.openxmlformats.org/drawingml/2006/main" xmlns:r="http://schemas.openxmlformats.org/officeDocument/2006/relationships" xmlns:p="http://schemas.openxmlformats.org/presentationml/2006/main">
   <p:cSld>
     <p:spTree>
@@ -4562,11 +4944,7 @@
             </a:r>
             <a:r>
               <a:rPr lang="en-US" dirty="0" smtClean="0"/>
-              <a:t>uiz </a:t>
-            </a:r>
-            <a:r>
-              <a:rPr lang="en-US" dirty="0" smtClean="0"/>
-              <a:t>1 in ML4 Lecture 13</a:t>
+              <a:t>uiz 1 in ML4 Lecture 13</a:t>
             </a:r>
             <a:endParaRPr lang="en-US" dirty="0"/>
           </a:p>
@@ -4838,11 +5216,7 @@
             </a:r>
             <a:r>
               <a:rPr lang="en-US" dirty="0" smtClean="0"/>
-              <a:t>uiz </a:t>
-            </a:r>
-            <a:r>
-              <a:rPr lang="en-US" dirty="0" smtClean="0"/>
-              <a:t>2 in ML4 Lecture 13</a:t>
+              <a:t>uiz 2 in ML4 Lecture 13</a:t>
             </a:r>
             <a:endParaRPr lang="en-US" dirty="0"/>
           </a:p>
@@ -5171,7 +5545,6 @@
               <a:rPr lang="en-US" dirty="0"/>
               <a:t>B</a:t>
             </a:r>
-            <a:endParaRPr lang="en-US" dirty="0"/>
           </a:p>
         </p:txBody>
       </p:sp>
@@ -5347,7 +5720,6 @@
               <a:rPr lang="en-US" dirty="0"/>
               <a:t>E</a:t>
             </a:r>
-            <a:endParaRPr lang="en-US" dirty="0"/>
           </a:p>
         </p:txBody>
       </p:sp>
@@ -5434,31 +5806,7 @@
       </p:grpSpPr>
       <p:pic>
         <p:nvPicPr>
-          <p:cNvPr id="10" name="Picture 9"/>
-          <p:cNvPicPr>
-            <a:picLocks noChangeAspect="1"/>
-          </p:cNvPicPr>
-          <p:nvPr/>
-        </p:nvPicPr>
-        <p:blipFill>
-          <a:blip/>
-          <a:stretch>
-            <a:fillRect/>
-          </a:stretch>
-        </p:blipFill>
-        <p:spPr>
-          <a:xfrm>
-            <a:off x="158940" y="426753"/>
-            <a:ext cx="4335885" cy="4590286"/>
-          </a:xfrm>
-          <a:prstGeom prst="rect">
-            <a:avLst/>
-          </a:prstGeom>
-        </p:spPr>
-      </p:pic>
-      <p:pic>
-        <p:nvPicPr>
-          <p:cNvPr id="11" name="Picture 10"/>
+          <p:cNvPr id="4" name="Picture 3"/>
           <p:cNvPicPr>
             <a:picLocks noChangeAspect="1"/>
           </p:cNvPicPr>
@@ -5472,18 +5820,472 @@
         </p:blipFill>
         <p:spPr>
           <a:xfrm>
-            <a:off x="4605257" y="426753"/>
-            <a:ext cx="4309998" cy="4749794"/>
+            <a:off x="5672" y="2122051"/>
+            <a:ext cx="2774758" cy="2180649"/>
           </a:xfrm>
           <a:prstGeom prst="rect">
             <a:avLst/>
           </a:prstGeom>
         </p:spPr>
       </p:pic>
+      <p:pic>
+        <p:nvPicPr>
+          <p:cNvPr id="6" name="Picture 5"/>
+          <p:cNvPicPr>
+            <a:picLocks noChangeAspect="1"/>
+          </p:cNvPicPr>
+          <p:nvPr/>
+        </p:nvPicPr>
+        <p:blipFill>
+          <a:blip r:embed="rId3"/>
+          <a:stretch>
+            <a:fillRect/>
+          </a:stretch>
+        </p:blipFill>
+        <p:spPr>
+          <a:xfrm>
+            <a:off x="5672" y="-31561"/>
+            <a:ext cx="2661328" cy="2208902"/>
+          </a:xfrm>
+          <a:prstGeom prst="rect">
+            <a:avLst/>
+          </a:prstGeom>
+        </p:spPr>
+      </p:pic>
+      <p:pic>
+        <p:nvPicPr>
+          <p:cNvPr id="8" name="Picture 7"/>
+          <p:cNvPicPr>
+            <a:picLocks noChangeAspect="1"/>
+          </p:cNvPicPr>
+          <p:nvPr/>
+        </p:nvPicPr>
+        <p:blipFill>
+          <a:blip r:embed="rId4"/>
+          <a:stretch>
+            <a:fillRect/>
+          </a:stretch>
+        </p:blipFill>
+        <p:spPr>
+          <a:xfrm>
+            <a:off x="5267196" y="-31561"/>
+            <a:ext cx="2780631" cy="2206740"/>
+          </a:xfrm>
+          <a:prstGeom prst="rect">
+            <a:avLst/>
+          </a:prstGeom>
+        </p:spPr>
+      </p:pic>
+      <p:pic>
+        <p:nvPicPr>
+          <p:cNvPr id="10" name="Picture 9"/>
+          <p:cNvPicPr>
+            <a:picLocks noChangeAspect="1"/>
+          </p:cNvPicPr>
+          <p:nvPr/>
+        </p:nvPicPr>
+        <p:blipFill>
+          <a:blip r:embed="rId5"/>
+          <a:stretch>
+            <a:fillRect/>
+          </a:stretch>
+        </p:blipFill>
+        <p:spPr>
+          <a:xfrm>
+            <a:off x="2736273" y="2122051"/>
+            <a:ext cx="5325962" cy="2119672"/>
+          </a:xfrm>
+          <a:prstGeom prst="rect">
+            <a:avLst/>
+          </a:prstGeom>
+        </p:spPr>
+      </p:pic>
+      <p:pic>
+        <p:nvPicPr>
+          <p:cNvPr id="13" name="Picture 12"/>
+          <p:cNvPicPr>
+            <a:picLocks noChangeAspect="1"/>
+          </p:cNvPicPr>
+          <p:nvPr/>
+        </p:nvPicPr>
+        <p:blipFill>
+          <a:blip r:embed="rId6"/>
+          <a:stretch>
+            <a:fillRect/>
+          </a:stretch>
+        </p:blipFill>
+        <p:spPr>
+          <a:xfrm>
+            <a:off x="6807687" y="2527509"/>
+            <a:ext cx="594975" cy="344082"/>
+          </a:xfrm>
+          <a:prstGeom prst="rect">
+            <a:avLst/>
+          </a:prstGeom>
+        </p:spPr>
+      </p:pic>
+      <p:pic>
+        <p:nvPicPr>
+          <p:cNvPr id="14" name="Picture 13"/>
+          <p:cNvPicPr>
+            <a:picLocks noChangeAspect="1"/>
+          </p:cNvPicPr>
+          <p:nvPr/>
+        </p:nvPicPr>
+        <p:blipFill>
+          <a:blip r:embed="rId7"/>
+          <a:stretch>
+            <a:fillRect/>
+          </a:stretch>
+        </p:blipFill>
+        <p:spPr>
+          <a:xfrm>
+            <a:off x="5778600" y="2529717"/>
+            <a:ext cx="580813" cy="341228"/>
+          </a:xfrm>
+          <a:prstGeom prst="rect">
+            <a:avLst/>
+          </a:prstGeom>
+        </p:spPr>
+      </p:pic>
+      <p:pic>
+        <p:nvPicPr>
+          <p:cNvPr id="15" name="Picture 14"/>
+          <p:cNvPicPr>
+            <a:picLocks noChangeAspect="1"/>
+          </p:cNvPicPr>
+          <p:nvPr/>
+        </p:nvPicPr>
+        <p:blipFill>
+          <a:blip r:embed="rId8"/>
+          <a:stretch>
+            <a:fillRect/>
+          </a:stretch>
+        </p:blipFill>
+        <p:spPr>
+          <a:xfrm>
+            <a:off x="4150693" y="2529716"/>
+            <a:ext cx="604466" cy="349571"/>
+          </a:xfrm>
+          <a:prstGeom prst="rect">
+            <a:avLst/>
+          </a:prstGeom>
+        </p:spPr>
+      </p:pic>
+      <p:pic>
+        <p:nvPicPr>
+          <p:cNvPr id="16" name="Picture 15"/>
+          <p:cNvPicPr>
+            <a:picLocks noChangeAspect="1"/>
+          </p:cNvPicPr>
+          <p:nvPr/>
+        </p:nvPicPr>
+        <p:blipFill>
+          <a:blip r:embed="rId9"/>
+          <a:stretch>
+            <a:fillRect/>
+          </a:stretch>
+        </p:blipFill>
+        <p:spPr>
+          <a:xfrm>
+            <a:off x="3167466" y="2527509"/>
+            <a:ext cx="542649" cy="318806"/>
+          </a:xfrm>
+          <a:prstGeom prst="rect">
+            <a:avLst/>
+          </a:prstGeom>
+        </p:spPr>
+      </p:pic>
+      <p:pic>
+        <p:nvPicPr>
+          <p:cNvPr id="17" name="Picture 16"/>
+          <p:cNvPicPr>
+            <a:picLocks noChangeAspect="1"/>
+          </p:cNvPicPr>
+          <p:nvPr/>
+        </p:nvPicPr>
+        <p:blipFill>
+          <a:blip r:embed="rId10"/>
+          <a:stretch>
+            <a:fillRect/>
+          </a:stretch>
+        </p:blipFill>
+        <p:spPr>
+          <a:xfrm>
+            <a:off x="2697788" y="-31561"/>
+            <a:ext cx="2569408" cy="2153612"/>
+          </a:xfrm>
+          <a:prstGeom prst="rect">
+            <a:avLst/>
+          </a:prstGeom>
+        </p:spPr>
+      </p:pic>
+      <p:sp>
+        <p:nvSpPr>
+          <p:cNvPr id="18" name="Rounded Rectangle 17"/>
+          <p:cNvSpPr/>
+          <p:nvPr/>
+        </p:nvSpPr>
+        <p:spPr>
+          <a:xfrm>
+            <a:off x="4797681" y="162402"/>
+            <a:ext cx="392545" cy="307879"/>
+          </a:xfrm>
+          <a:prstGeom prst="roundRect">
+            <a:avLst/>
+          </a:prstGeom>
+        </p:spPr>
+        <p:style>
+          <a:lnRef idx="2">
+            <a:schemeClr val="dk1">
+              <a:shade val="50000"/>
+            </a:schemeClr>
+          </a:lnRef>
+          <a:fillRef idx="1">
+            <a:schemeClr val="dk1"/>
+          </a:fillRef>
+          <a:effectRef idx="0">
+            <a:schemeClr val="dk1"/>
+          </a:effectRef>
+          <a:fontRef idx="minor">
+            <a:schemeClr val="lt1"/>
+          </a:fontRef>
+        </p:style>
+        <p:txBody>
+          <a:bodyPr rtlCol="0" anchor="ctr"/>
+          <a:lstStyle/>
+          <a:p>
+            <a:pPr algn="ctr"/>
+            <a:r>
+              <a:rPr lang="en-US" dirty="0"/>
+              <a:t>B</a:t>
+            </a:r>
+          </a:p>
+        </p:txBody>
+      </p:sp>
+      <p:sp>
+        <p:nvSpPr>
+          <p:cNvPr id="19" name="Rounded Rectangle 18"/>
+          <p:cNvSpPr/>
+          <p:nvPr/>
+        </p:nvSpPr>
+        <p:spPr>
+          <a:xfrm>
+            <a:off x="2124363" y="171638"/>
+            <a:ext cx="392545" cy="307879"/>
+          </a:xfrm>
+          <a:prstGeom prst="roundRect">
+            <a:avLst/>
+          </a:prstGeom>
+        </p:spPr>
+        <p:style>
+          <a:lnRef idx="2">
+            <a:schemeClr val="dk1">
+              <a:shade val="50000"/>
+            </a:schemeClr>
+          </a:lnRef>
+          <a:fillRef idx="1">
+            <a:schemeClr val="dk1"/>
+          </a:fillRef>
+          <a:effectRef idx="0">
+            <a:schemeClr val="dk1"/>
+          </a:effectRef>
+          <a:fontRef idx="minor">
+            <a:schemeClr val="lt1"/>
+          </a:fontRef>
+        </p:style>
+        <p:txBody>
+          <a:bodyPr rtlCol="0" anchor="ctr"/>
+          <a:lstStyle/>
+          <a:p>
+            <a:pPr algn="ctr"/>
+            <a:r>
+              <a:rPr lang="en-US" dirty="0" smtClean="0"/>
+              <a:t>A</a:t>
+            </a:r>
+            <a:endParaRPr lang="en-US" dirty="0"/>
+          </a:p>
+        </p:txBody>
+      </p:sp>
+      <p:sp>
+        <p:nvSpPr>
+          <p:cNvPr id="20" name="Rounded Rectangle 19"/>
+          <p:cNvSpPr/>
+          <p:nvPr/>
+        </p:nvSpPr>
+        <p:spPr>
+          <a:xfrm>
+            <a:off x="7440022" y="161638"/>
+            <a:ext cx="392545" cy="307879"/>
+          </a:xfrm>
+          <a:prstGeom prst="roundRect">
+            <a:avLst/>
+          </a:prstGeom>
+        </p:spPr>
+        <p:style>
+          <a:lnRef idx="2">
+            <a:schemeClr val="dk1">
+              <a:shade val="50000"/>
+            </a:schemeClr>
+          </a:lnRef>
+          <a:fillRef idx="1">
+            <a:schemeClr val="dk1"/>
+          </a:fillRef>
+          <a:effectRef idx="0">
+            <a:schemeClr val="dk1"/>
+          </a:effectRef>
+          <a:fontRef idx="minor">
+            <a:schemeClr val="lt1"/>
+          </a:fontRef>
+        </p:style>
+        <p:txBody>
+          <a:bodyPr rtlCol="0" anchor="ctr"/>
+          <a:lstStyle/>
+          <a:p>
+            <a:pPr algn="ctr"/>
+            <a:r>
+              <a:rPr lang="en-US" dirty="0" smtClean="0"/>
+              <a:t>C</a:t>
+            </a:r>
+            <a:endParaRPr lang="en-US" dirty="0"/>
+          </a:p>
+        </p:txBody>
+      </p:sp>
+      <p:sp>
+        <p:nvSpPr>
+          <p:cNvPr id="21" name="Rounded Rectangle 20"/>
+          <p:cNvSpPr/>
+          <p:nvPr/>
+        </p:nvSpPr>
+        <p:spPr>
+          <a:xfrm>
+            <a:off x="2126187" y="2563066"/>
+            <a:ext cx="392545" cy="307879"/>
+          </a:xfrm>
+          <a:prstGeom prst="roundRect">
+            <a:avLst/>
+          </a:prstGeom>
+        </p:spPr>
+        <p:style>
+          <a:lnRef idx="2">
+            <a:schemeClr val="dk1">
+              <a:shade val="50000"/>
+            </a:schemeClr>
+          </a:lnRef>
+          <a:fillRef idx="1">
+            <a:schemeClr val="dk1"/>
+          </a:fillRef>
+          <a:effectRef idx="0">
+            <a:schemeClr val="dk1"/>
+          </a:effectRef>
+          <a:fontRef idx="minor">
+            <a:schemeClr val="lt1"/>
+          </a:fontRef>
+        </p:style>
+        <p:txBody>
+          <a:bodyPr rtlCol="0" anchor="ctr"/>
+          <a:lstStyle/>
+          <a:p>
+            <a:pPr algn="ctr"/>
+            <a:r>
+              <a:rPr lang="en-US" dirty="0" smtClean="0"/>
+              <a:t>D</a:t>
+            </a:r>
+            <a:endParaRPr lang="en-US" dirty="0"/>
+          </a:p>
+        </p:txBody>
+      </p:sp>
+      <p:sp>
+        <p:nvSpPr>
+          <p:cNvPr id="22" name="Rounded Rectangle 21"/>
+          <p:cNvSpPr/>
+          <p:nvPr/>
+        </p:nvSpPr>
+        <p:spPr>
+          <a:xfrm>
+            <a:off x="4797681" y="2563066"/>
+            <a:ext cx="392545" cy="307879"/>
+          </a:xfrm>
+          <a:prstGeom prst="roundRect">
+            <a:avLst/>
+          </a:prstGeom>
+        </p:spPr>
+        <p:style>
+          <a:lnRef idx="2">
+            <a:schemeClr val="dk1">
+              <a:shade val="50000"/>
+            </a:schemeClr>
+          </a:lnRef>
+          <a:fillRef idx="1">
+            <a:schemeClr val="dk1"/>
+          </a:fillRef>
+          <a:effectRef idx="0">
+            <a:schemeClr val="dk1"/>
+          </a:effectRef>
+          <a:fontRef idx="minor">
+            <a:schemeClr val="lt1"/>
+          </a:fontRef>
+        </p:style>
+        <p:txBody>
+          <a:bodyPr rtlCol="0" anchor="ctr"/>
+          <a:lstStyle/>
+          <a:p>
+            <a:pPr algn="ctr"/>
+            <a:r>
+              <a:rPr lang="en-US" dirty="0"/>
+              <a:t>E</a:t>
+            </a:r>
+          </a:p>
+        </p:txBody>
+      </p:sp>
+      <p:sp>
+        <p:nvSpPr>
+          <p:cNvPr id="23" name="Rounded Rectangle 22"/>
+          <p:cNvSpPr/>
+          <p:nvPr/>
+        </p:nvSpPr>
+        <p:spPr>
+          <a:xfrm>
+            <a:off x="7463113" y="2563712"/>
+            <a:ext cx="392545" cy="307879"/>
+          </a:xfrm>
+          <a:prstGeom prst="roundRect">
+            <a:avLst/>
+          </a:prstGeom>
+        </p:spPr>
+        <p:style>
+          <a:lnRef idx="2">
+            <a:schemeClr val="dk1">
+              <a:shade val="50000"/>
+            </a:schemeClr>
+          </a:lnRef>
+          <a:fillRef idx="1">
+            <a:schemeClr val="dk1"/>
+          </a:fillRef>
+          <a:effectRef idx="0">
+            <a:schemeClr val="dk1"/>
+          </a:effectRef>
+          <a:fontRef idx="minor">
+            <a:schemeClr val="lt1"/>
+          </a:fontRef>
+        </p:style>
+        <p:txBody>
+          <a:bodyPr rtlCol="0" anchor="ctr"/>
+          <a:lstStyle/>
+          <a:p>
+            <a:pPr algn="ctr"/>
+            <a:r>
+              <a:rPr lang="en-US" dirty="0" smtClean="0"/>
+              <a:t>F</a:t>
+            </a:r>
+            <a:endParaRPr lang="en-US" dirty="0"/>
+          </a:p>
+        </p:txBody>
+      </p:sp>
     </p:spTree>
     <p:extLst>
       <p:ext uri="{BB962C8B-B14F-4D97-AF65-F5344CB8AC3E}">
-        <p14:creationId xmlns:p14="http://schemas.microsoft.com/office/powerpoint/2010/main" val="1098766248"/>
+        <p14:creationId xmlns:p14="http://schemas.microsoft.com/office/powerpoint/2010/main" val="3129610917"/>
       </p:ext>
     </p:extLst>
   </p:cSld>
@@ -5519,27 +6321,46 @@
       </p:grpSpPr>
       <p:pic>
         <p:nvPicPr>
-          <p:cNvPr id="4" name="Picture 3" descr="rewatchingsessions.png"/>
+          <p:cNvPr id="10" name="Picture 9"/>
           <p:cNvPicPr>
             <a:picLocks noChangeAspect="1"/>
           </p:cNvPicPr>
           <p:nvPr/>
         </p:nvPicPr>
-        <p:blipFill rotWithShape="1">
-          <a:blip r:embed="rId2">
-            <a:extLst>
-              <a:ext uri="{28A0092B-C50C-407E-A947-70E740481C1C}">
-                <a14:useLocalDpi xmlns:a14="http://schemas.microsoft.com/office/drawing/2010/main" val="0"/>
-              </a:ext>
-            </a:extLst>
-          </a:blip>
-          <a:srcRect l="11113" t="6190" r="16779"/>
-          <a:stretch/>
+        <p:blipFill>
+          <a:blip/>
+          <a:stretch>
+            <a:fillRect/>
+          </a:stretch>
         </p:blipFill>
         <p:spPr>
           <a:xfrm>
-            <a:off x="1404039" y="1774896"/>
-            <a:ext cx="5119220" cy="3347824"/>
+            <a:off x="158940" y="426753"/>
+            <a:ext cx="4335885" cy="4590286"/>
+          </a:xfrm>
+          <a:prstGeom prst="rect">
+            <a:avLst/>
+          </a:prstGeom>
+        </p:spPr>
+      </p:pic>
+      <p:pic>
+        <p:nvPicPr>
+          <p:cNvPr id="11" name="Picture 10"/>
+          <p:cNvPicPr>
+            <a:picLocks noChangeAspect="1"/>
+          </p:cNvPicPr>
+          <p:nvPr/>
+        </p:nvPicPr>
+        <p:blipFill>
+          <a:blip r:embed="rId2"/>
+          <a:stretch>
+            <a:fillRect/>
+          </a:stretch>
+        </p:blipFill>
+        <p:spPr>
+          <a:xfrm>
+            <a:off x="4605257" y="426753"/>
+            <a:ext cx="4309998" cy="4749794"/>
           </a:xfrm>
           <a:prstGeom prst="rect">
             <a:avLst/>
@@ -5549,7 +6370,7 @@
     </p:spTree>
     <p:extLst>
       <p:ext uri="{BB962C8B-B14F-4D97-AF65-F5344CB8AC3E}">
-        <p14:creationId xmlns:p14="http://schemas.microsoft.com/office/powerpoint/2010/main" val="2225149206"/>
+        <p14:creationId xmlns:p14="http://schemas.microsoft.com/office/powerpoint/2010/main" val="1098766248"/>
       </p:ext>
     </p:extLst>
   </p:cSld>
@@ -5585,13 +6406,13 @@
       </p:grpSpPr>
       <p:pic>
         <p:nvPicPr>
-          <p:cNvPr id="12" name="Picture 11" descr="seek-scatter2.png"/>
+          <p:cNvPr id="4" name="Picture 3" descr="rewatchingsessions.png"/>
           <p:cNvPicPr>
             <a:picLocks noChangeAspect="1"/>
           </p:cNvPicPr>
           <p:nvPr/>
         </p:nvPicPr>
-        <p:blipFill>
+        <p:blipFill rotWithShape="1">
           <a:blip r:embed="rId2">
             <a:extLst>
               <a:ext uri="{28A0092B-C50C-407E-A947-70E740481C1C}">
@@ -5599,330 +6420,23 @@
               </a:ext>
             </a:extLst>
           </a:blip>
-          <a:stretch>
-            <a:fillRect/>
-          </a:stretch>
+          <a:srcRect l="11113" t="6190" r="16779"/>
+          <a:stretch/>
         </p:blipFill>
         <p:spPr>
           <a:xfrm>
-            <a:off x="1177572" y="892156"/>
-            <a:ext cx="7370116" cy="2941820"/>
+            <a:off x="1404039" y="1774896"/>
+            <a:ext cx="5119220" cy="3347824"/>
           </a:xfrm>
           <a:prstGeom prst="rect">
             <a:avLst/>
           </a:prstGeom>
         </p:spPr>
       </p:pic>
-      <p:sp>
-        <p:nvSpPr>
-          <p:cNvPr id="5" name="Rounded Rectangular Callout 4"/>
-          <p:cNvSpPr/>
-          <p:nvPr/>
-        </p:nvSpPr>
-        <p:spPr>
-          <a:xfrm>
-            <a:off x="3052749" y="3833976"/>
-            <a:ext cx="1619992" cy="264592"/>
-          </a:xfrm>
-          <a:prstGeom prst="wedgeRoundRectCallout">
-            <a:avLst>
-              <a:gd name="adj1" fmla="val -18295"/>
-              <a:gd name="adj2" fmla="val -177080"/>
-              <a:gd name="adj3" fmla="val 16667"/>
-            </a:avLst>
-          </a:prstGeom>
-        </p:spPr>
-        <p:style>
-          <a:lnRef idx="1">
-            <a:schemeClr val="accent1"/>
-          </a:lnRef>
-          <a:fillRef idx="3">
-            <a:schemeClr val="accent1"/>
-          </a:fillRef>
-          <a:effectRef idx="2">
-            <a:schemeClr val="accent1"/>
-          </a:effectRef>
-          <a:fontRef idx="minor">
-            <a:schemeClr val="lt1"/>
-          </a:fontRef>
-        </p:style>
-        <p:txBody>
-          <a:bodyPr rtlCol="0" anchor="ctr"/>
-          <a:lstStyle/>
-          <a:p>
-            <a:pPr algn="ctr"/>
-            <a:r>
-              <a:rPr lang="en-US" altLang="zh-CN" sz="1200" dirty="0" smtClean="0"/>
-              <a:t>In-video quiz</a:t>
-            </a:r>
-            <a:r>
-              <a:rPr lang="zh-CN" altLang="en-US" sz="1200" dirty="0" smtClean="0"/>
-              <a:t> </a:t>
-            </a:r>
-            <a:r>
-              <a:rPr lang="en-US" altLang="zh-CN" sz="1200" dirty="0" smtClean="0"/>
-              <a:t>1 (t=146)</a:t>
-            </a:r>
-            <a:endParaRPr lang="en-US" sz="1200" dirty="0"/>
-          </a:p>
-        </p:txBody>
-      </p:sp>
-      <p:sp>
-        <p:nvSpPr>
-          <p:cNvPr id="6" name="Rounded Rectangular Callout 5"/>
-          <p:cNvSpPr/>
-          <p:nvPr/>
-        </p:nvSpPr>
-        <p:spPr>
-          <a:xfrm>
-            <a:off x="5617058" y="3838607"/>
-            <a:ext cx="1725820" cy="259961"/>
-          </a:xfrm>
-          <a:prstGeom prst="wedgeRoundRectCallout">
-            <a:avLst>
-              <a:gd name="adj1" fmla="val -7859"/>
-              <a:gd name="adj2" fmla="val -172253"/>
-              <a:gd name="adj3" fmla="val 16667"/>
-            </a:avLst>
-          </a:prstGeom>
-        </p:spPr>
-        <p:style>
-          <a:lnRef idx="1">
-            <a:schemeClr val="accent1"/>
-          </a:lnRef>
-          <a:fillRef idx="3">
-            <a:schemeClr val="accent1"/>
-          </a:fillRef>
-          <a:effectRef idx="2">
-            <a:schemeClr val="accent1"/>
-          </a:effectRef>
-          <a:fontRef idx="minor">
-            <a:schemeClr val="lt1"/>
-          </a:fontRef>
-        </p:style>
-        <p:txBody>
-          <a:bodyPr rtlCol="0" anchor="ctr"/>
-          <a:lstStyle/>
-          <a:p>
-            <a:pPr algn="ctr"/>
-            <a:r>
-              <a:rPr lang="en-US" altLang="zh-CN" sz="1200" dirty="0" smtClean="0"/>
-              <a:t>In-video quiz</a:t>
-            </a:r>
-            <a:r>
-              <a:rPr lang="zh-CN" altLang="en-US" sz="1200" dirty="0" smtClean="0"/>
-              <a:t> </a:t>
-            </a:r>
-            <a:r>
-              <a:rPr lang="en-US" altLang="zh-CN" sz="1200" dirty="0" smtClean="0"/>
-              <a:t>2 (t=376)</a:t>
-            </a:r>
-            <a:endParaRPr lang="en-US" sz="1200" dirty="0"/>
-          </a:p>
-        </p:txBody>
-      </p:sp>
-      <p:sp>
-        <p:nvSpPr>
-          <p:cNvPr id="7" name="Rounded Rectangular Callout 6"/>
-          <p:cNvSpPr/>
-          <p:nvPr/>
-        </p:nvSpPr>
-        <p:spPr>
-          <a:xfrm>
-            <a:off x="436631" y="2700615"/>
-            <a:ext cx="757082" cy="580315"/>
-          </a:xfrm>
-          <a:prstGeom prst="wedgeRoundRectCallout">
-            <a:avLst>
-              <a:gd name="adj1" fmla="val 130605"/>
-              <a:gd name="adj2" fmla="val -26592"/>
-              <a:gd name="adj3" fmla="val 16667"/>
-            </a:avLst>
-          </a:prstGeom>
-        </p:spPr>
-        <p:style>
-          <a:lnRef idx="1">
-            <a:schemeClr val="accent1"/>
-          </a:lnRef>
-          <a:fillRef idx="3">
-            <a:schemeClr val="accent1"/>
-          </a:fillRef>
-          <a:effectRef idx="2">
-            <a:schemeClr val="accent1"/>
-          </a:effectRef>
-          <a:fontRef idx="minor">
-            <a:schemeClr val="lt1"/>
-          </a:fontRef>
-        </p:style>
-        <p:txBody>
-          <a:bodyPr rtlCol="0" anchor="ctr"/>
-          <a:lstStyle/>
-          <a:p>
-            <a:pPr algn="ctr"/>
-            <a:r>
-              <a:rPr lang="en-US" altLang="zh-CN" sz="1200" dirty="0" smtClean="0"/>
-              <a:t>In-video quiz</a:t>
-            </a:r>
-            <a:r>
-              <a:rPr lang="zh-CN" altLang="en-US" sz="1200" dirty="0" smtClean="0"/>
-              <a:t> </a:t>
-            </a:r>
-            <a:r>
-              <a:rPr lang="en-US" altLang="zh-CN" sz="1200" dirty="0" smtClean="0"/>
-              <a:t>1 (t=146)</a:t>
-            </a:r>
-            <a:endParaRPr lang="en-US" sz="1200" dirty="0"/>
-          </a:p>
-        </p:txBody>
-      </p:sp>
-      <p:sp>
-        <p:nvSpPr>
-          <p:cNvPr id="8" name="Rounded Rectangular Callout 7"/>
-          <p:cNvSpPr/>
-          <p:nvPr/>
-        </p:nvSpPr>
-        <p:spPr>
-          <a:xfrm>
-            <a:off x="436631" y="1680673"/>
-            <a:ext cx="757082" cy="582599"/>
-          </a:xfrm>
-          <a:prstGeom prst="wedgeRoundRectCallout">
-            <a:avLst>
-              <a:gd name="adj1" fmla="val 128454"/>
-              <a:gd name="adj2" fmla="val -28411"/>
-              <a:gd name="adj3" fmla="val 16667"/>
-            </a:avLst>
-          </a:prstGeom>
-        </p:spPr>
-        <p:style>
-          <a:lnRef idx="1">
-            <a:schemeClr val="accent1"/>
-          </a:lnRef>
-          <a:fillRef idx="3">
-            <a:schemeClr val="accent1"/>
-          </a:fillRef>
-          <a:effectRef idx="2">
-            <a:schemeClr val="accent1"/>
-          </a:effectRef>
-          <a:fontRef idx="minor">
-            <a:schemeClr val="lt1"/>
-          </a:fontRef>
-        </p:style>
-        <p:txBody>
-          <a:bodyPr rtlCol="0" anchor="ctr"/>
-          <a:lstStyle/>
-          <a:p>
-            <a:pPr algn="ctr"/>
-            <a:r>
-              <a:rPr lang="en-US" altLang="zh-CN" sz="1200" dirty="0" smtClean="0"/>
-              <a:t>In-video quiz</a:t>
-            </a:r>
-            <a:r>
-              <a:rPr lang="zh-CN" altLang="en-US" sz="1200" dirty="0" smtClean="0"/>
-              <a:t> </a:t>
-            </a:r>
-            <a:r>
-              <a:rPr lang="en-US" altLang="zh-CN" sz="1200" dirty="0" smtClean="0"/>
-              <a:t>2 (t=376)</a:t>
-            </a:r>
-            <a:endParaRPr lang="en-US" sz="1200" dirty="0"/>
-          </a:p>
-        </p:txBody>
-      </p:sp>
-      <p:sp>
-        <p:nvSpPr>
-          <p:cNvPr id="9" name="TextBox 8"/>
-          <p:cNvSpPr txBox="1"/>
-          <p:nvPr/>
-        </p:nvSpPr>
-        <p:spPr>
-          <a:xfrm rot="16200000">
-            <a:off x="-1424574" y="2370593"/>
-            <a:ext cx="3423416" cy="261610"/>
-          </a:xfrm>
-          <a:prstGeom prst="rect">
-            <a:avLst/>
-          </a:prstGeom>
-          <a:noFill/>
-        </p:spPr>
-        <p:txBody>
-          <a:bodyPr wrap="square" rtlCol="0">
-            <a:spAutoFit/>
-          </a:bodyPr>
-          <a:lstStyle/>
-          <a:p>
-            <a:r>
-              <a:rPr lang="en-US" sz="1100" dirty="0" smtClean="0"/>
-              <a:t>Destination of seek event (position in video, in seconds)</a:t>
-            </a:r>
-            <a:endParaRPr lang="en-US" sz="1100" dirty="0"/>
-          </a:p>
-        </p:txBody>
-      </p:sp>
-      <p:sp>
-        <p:nvSpPr>
-          <p:cNvPr id="10" name="TextBox 9"/>
-          <p:cNvSpPr txBox="1"/>
-          <p:nvPr/>
-        </p:nvSpPr>
-        <p:spPr>
-          <a:xfrm>
-            <a:off x="2919252" y="4128441"/>
-            <a:ext cx="3088269" cy="261610"/>
-          </a:xfrm>
-          <a:prstGeom prst="rect">
-            <a:avLst/>
-          </a:prstGeom>
-          <a:noFill/>
-        </p:spPr>
-        <p:txBody>
-          <a:bodyPr wrap="square" rtlCol="0">
-            <a:spAutoFit/>
-          </a:bodyPr>
-          <a:lstStyle/>
-          <a:p>
-            <a:r>
-              <a:rPr lang="en-US" sz="1100" dirty="0" smtClean="0"/>
-              <a:t>Start of seek event (position in video, in seconds)</a:t>
-            </a:r>
-            <a:endParaRPr lang="en-US" sz="1100" dirty="0"/>
-          </a:p>
-        </p:txBody>
-      </p:sp>
-      <p:sp>
-        <p:nvSpPr>
-          <p:cNvPr id="11" name="TextBox 10"/>
-          <p:cNvSpPr txBox="1"/>
-          <p:nvPr/>
-        </p:nvSpPr>
-        <p:spPr>
-          <a:xfrm>
-            <a:off x="646015" y="4617885"/>
-            <a:ext cx="7836556" cy="1569660"/>
-          </a:xfrm>
-          <a:prstGeom prst="rect">
-            <a:avLst/>
-          </a:prstGeom>
-          <a:noFill/>
-        </p:spPr>
-        <p:txBody>
-          <a:bodyPr wrap="square" rtlCol="0">
-            <a:spAutoFit/>
-          </a:bodyPr>
-          <a:lstStyle/>
-          <a:p>
-            <a:r>
-              <a:rPr lang="en-US" sz="1200" dirty="0" smtClean="0"/>
-              <a:t>Seeks sources and destinations within a Coursera lecture video (Machine Learning, lecture 13), shown as a scatter plot on the left, and a 2D histogram on the right. A point at coordinate (x,y) represents a seek event starting from time x, going to time y in the video. Points above the diagonal are seeks going forward, and points below the diagonal are seeks going back. We see there are many seeks from the start of the video to the first in-video quiz, as shown at point (0,146); there are also many seeks from immediately after the first in-video quiz to the second in-video quiz, as shown at point (146,376). As we can see at lines y=146 and y=376, users do not tend to skip past the in-video quizzes to the next subsection, and they do not tend to skip back to previous subsections. If we look at backwards seeks (points below the diagonal), they mostly originate at the in-video quizzes (x=146 and x=376), and go to points in the immediately preceding section.</a:t>
-            </a:r>
-            <a:endParaRPr lang="en-US" sz="1200" dirty="0"/>
-          </a:p>
-        </p:txBody>
-      </p:sp>
     </p:spTree>
     <p:extLst>
       <p:ext uri="{BB962C8B-B14F-4D97-AF65-F5344CB8AC3E}">
-        <p14:creationId xmlns:p14="http://schemas.microsoft.com/office/powerpoint/2010/main" val="1942118298"/>
+        <p14:creationId xmlns:p14="http://schemas.microsoft.com/office/powerpoint/2010/main" val="2225149206"/>
       </p:ext>
     </p:extLst>
   </p:cSld>
@@ -5958,7 +6472,7 @@
       </p:grpSpPr>
       <p:pic>
         <p:nvPicPr>
-          <p:cNvPr id="4" name="Picture 3" descr="seek-scatter2.png"/>
+          <p:cNvPr id="12" name="Picture 11" descr="seek-scatter2.png"/>
           <p:cNvPicPr>
             <a:picLocks noChangeAspect="1"/>
           </p:cNvPicPr>
@@ -5995,11 +6509,11 @@
         <p:spPr>
           <a:xfrm>
             <a:off x="3052749" y="3833976"/>
-            <a:ext cx="2034948" cy="264592"/>
+            <a:ext cx="1619992" cy="264592"/>
           </a:xfrm>
           <a:prstGeom prst="wedgeRoundRectCallout">
             <a:avLst>
-              <a:gd name="adj1" fmla="val -23969"/>
+              <a:gd name="adj1" fmla="val -18295"/>
               <a:gd name="adj2" fmla="val -177080"/>
               <a:gd name="adj3" fmla="val 16667"/>
             </a:avLst>
@@ -6034,7 +6548,7 @@
             </a:r>
             <a:r>
               <a:rPr lang="en-US" altLang="zh-CN" sz="1200" dirty="0" smtClean="0"/>
-              <a:t>1 (146 seconds)</a:t>
+              <a:t>1 (t=146)</a:t>
             </a:r>
             <a:endParaRPr lang="en-US" sz="1200" dirty="0"/>
           </a:p>
@@ -6048,13 +6562,13 @@
         </p:nvSpPr>
         <p:spPr>
           <a:xfrm>
-            <a:off x="5780423" y="3838607"/>
-            <a:ext cx="2008910" cy="259961"/>
+            <a:off x="5617058" y="3838607"/>
+            <a:ext cx="1725820" cy="259961"/>
           </a:xfrm>
           <a:prstGeom prst="wedgeRoundRectCallout">
             <a:avLst>
-              <a:gd name="adj1" fmla="val -21435"/>
-              <a:gd name="adj2" fmla="val -181135"/>
+              <a:gd name="adj1" fmla="val -7859"/>
+              <a:gd name="adj2" fmla="val -172253"/>
               <a:gd name="adj3" fmla="val 16667"/>
             </a:avLst>
           </a:prstGeom>
@@ -6088,7 +6602,7 @@
             </a:r>
             <a:r>
               <a:rPr lang="en-US" altLang="zh-CN" sz="1200" dirty="0" smtClean="0"/>
-              <a:t>2 (376 seconds)</a:t>
+              <a:t>2 (t=376)</a:t>
             </a:r>
             <a:endParaRPr lang="en-US" sz="1200" dirty="0"/>
           </a:p>
@@ -6102,12 +6616,12 @@
         </p:nvSpPr>
         <p:spPr>
           <a:xfrm>
-            <a:off x="356364" y="2647758"/>
-            <a:ext cx="837349" cy="762000"/>
+            <a:off x="436631" y="2700615"/>
+            <a:ext cx="757082" cy="580315"/>
           </a:xfrm>
           <a:prstGeom prst="wedgeRoundRectCallout">
             <a:avLst>
-              <a:gd name="adj1" fmla="val 124171"/>
+              <a:gd name="adj1" fmla="val 130605"/>
               <a:gd name="adj2" fmla="val -26592"/>
               <a:gd name="adj3" fmla="val 16667"/>
             </a:avLst>
@@ -6142,7 +6656,7 @@
             </a:r>
             <a:r>
               <a:rPr lang="en-US" altLang="zh-CN" sz="1200" dirty="0" smtClean="0"/>
-              <a:t>1 (146 seconds)</a:t>
+              <a:t>1 (t=146)</a:t>
             </a:r>
             <a:endParaRPr lang="en-US" sz="1200" dirty="0"/>
           </a:p>
@@ -6156,12 +6670,12 @@
         </p:nvSpPr>
         <p:spPr>
           <a:xfrm>
-            <a:off x="356364" y="1631758"/>
-            <a:ext cx="837349" cy="738909"/>
+            <a:off x="436631" y="1680673"/>
+            <a:ext cx="757082" cy="582599"/>
           </a:xfrm>
           <a:prstGeom prst="wedgeRoundRectCallout">
             <a:avLst>
-              <a:gd name="adj1" fmla="val 122019"/>
+              <a:gd name="adj1" fmla="val 128454"/>
               <a:gd name="adj2" fmla="val -28411"/>
               <a:gd name="adj3" fmla="val 16667"/>
             </a:avLst>
@@ -6196,7 +6710,7 @@
             </a:r>
             <a:r>
               <a:rPr lang="en-US" altLang="zh-CN" sz="1200" dirty="0" smtClean="0"/>
-              <a:t>2 (376 seconds)</a:t>
+              <a:t>2 (t=376)</a:t>
             </a:r>
             <a:endParaRPr lang="en-US" sz="1200" dirty="0"/>
           </a:p>
@@ -6210,7 +6724,7 @@
         </p:nvSpPr>
         <p:spPr>
           <a:xfrm rot="16200000">
-            <a:off x="-1486150" y="2370593"/>
+            <a:off x="-1424574" y="2370593"/>
             <a:ext cx="3423416" cy="261610"/>
           </a:xfrm>
           <a:prstGeom prst="rect">
@@ -6270,8 +6784,8 @@
         </p:nvSpPr>
         <p:spPr>
           <a:xfrm>
-            <a:off x="1701031" y="566575"/>
-            <a:ext cx="6603999" cy="338554"/>
+            <a:off x="646015" y="4617885"/>
+            <a:ext cx="7836556" cy="1569660"/>
           </a:xfrm>
           <a:prstGeom prst="rect">
             <a:avLst/>
@@ -6285,17 +6799,17 @@
           <a:lstStyle/>
           <a:p>
             <a:r>
-              <a:rPr lang="en-US" sz="1600" b="1" dirty="0" smtClean="0"/>
-              <a:t>Scatter Plot of Seek Sources and Destinations in ML4 Lecture 13 on Coursera</a:t>
-            </a:r>
-            <a:endParaRPr lang="en-US" sz="1600" b="1" dirty="0"/>
+              <a:rPr lang="en-US" sz="1200" dirty="0" smtClean="0"/>
+              <a:t>Seeks sources and destinations within a Coursera lecture video (Machine Learning, lecture 13), shown as a scatter plot on the left, and a 2D histogram on the right. A point at coordinate (x,y) represents a seek event starting from time x, going to time y in the video. Points above the diagonal are seeks going forward, and points below the diagonal are seeks going back. We see there are many seeks from the start of the video to the first in-video quiz, as shown at point (0,146); there are also many seeks from immediately after the first in-video quiz to the second in-video quiz, as shown at point (146,376). As we can see at lines y=146 and y=376, users do not tend to skip past the in-video quizzes to the next subsection, and they do not tend to skip back to previous subsections. If we look at backwards seeks (points below the diagonal), they mostly originate at the in-video quizzes (x=146 and x=376), and go to points in the immediately preceding section.</a:t>
+            </a:r>
+            <a:endParaRPr lang="en-US" sz="1200" dirty="0"/>
           </a:p>
         </p:txBody>
       </p:sp>
     </p:spTree>
     <p:extLst>
       <p:ext uri="{BB962C8B-B14F-4D97-AF65-F5344CB8AC3E}">
-        <p14:creationId xmlns:p14="http://schemas.microsoft.com/office/powerpoint/2010/main" val="2231428280"/>
+        <p14:creationId xmlns:p14="http://schemas.microsoft.com/office/powerpoint/2010/main" val="1942118298"/>
       </p:ext>
     </p:extLst>
   </p:cSld>
@@ -6379,16 +6893,14 @@
           </a:prstGeom>
         </p:spPr>
         <p:style>
-          <a:lnRef idx="2">
-            <a:schemeClr val="dk1">
-              <a:shade val="50000"/>
-            </a:schemeClr>
+          <a:lnRef idx="1">
+            <a:schemeClr val="accent1"/>
           </a:lnRef>
-          <a:fillRef idx="1">
-            <a:schemeClr val="dk1"/>
+          <a:fillRef idx="3">
+            <a:schemeClr val="accent1"/>
           </a:fillRef>
-          <a:effectRef idx="0">
-            <a:schemeClr val="dk1"/>
+          <a:effectRef idx="2">
+            <a:schemeClr val="accent1"/>
           </a:effectRef>
           <a:fontRef idx="minor">
             <a:schemeClr val="lt1"/>
@@ -6435,16 +6947,14 @@
           </a:prstGeom>
         </p:spPr>
         <p:style>
-          <a:lnRef idx="2">
-            <a:schemeClr val="dk1">
-              <a:shade val="50000"/>
-            </a:schemeClr>
+          <a:lnRef idx="1">
+            <a:schemeClr val="accent1"/>
           </a:lnRef>
-          <a:fillRef idx="1">
-            <a:schemeClr val="dk1"/>
+          <a:fillRef idx="3">
+            <a:schemeClr val="accent1"/>
           </a:fillRef>
-          <a:effectRef idx="0">
-            <a:schemeClr val="dk1"/>
+          <a:effectRef idx="2">
+            <a:schemeClr val="accent1"/>
           </a:effectRef>
           <a:fontRef idx="minor">
             <a:schemeClr val="lt1"/>
@@ -6491,16 +7001,14 @@
           </a:prstGeom>
         </p:spPr>
         <p:style>
-          <a:lnRef idx="2">
-            <a:schemeClr val="dk1">
-              <a:shade val="50000"/>
-            </a:schemeClr>
+          <a:lnRef idx="1">
+            <a:schemeClr val="accent1"/>
           </a:lnRef>
-          <a:fillRef idx="1">
-            <a:schemeClr val="dk1"/>
+          <a:fillRef idx="3">
+            <a:schemeClr val="accent1"/>
           </a:fillRef>
-          <a:effectRef idx="0">
-            <a:schemeClr val="dk1"/>
+          <a:effectRef idx="2">
+            <a:schemeClr val="accent1"/>
           </a:effectRef>
           <a:fontRef idx="minor">
             <a:schemeClr val="lt1"/>
@@ -6547,16 +7055,14 @@
           </a:prstGeom>
         </p:spPr>
         <p:style>
-          <a:lnRef idx="2">
-            <a:schemeClr val="dk1">
-              <a:shade val="50000"/>
-            </a:schemeClr>
+          <a:lnRef idx="1">
+            <a:schemeClr val="accent1"/>
           </a:lnRef>
-          <a:fillRef idx="1">
-            <a:schemeClr val="dk1"/>
+          <a:fillRef idx="3">
+            <a:schemeClr val="accent1"/>
           </a:fillRef>
-          <a:effectRef idx="0">
-            <a:schemeClr val="dk1"/>
+          <a:effectRef idx="2">
+            <a:schemeClr val="accent1"/>
           </a:effectRef>
           <a:fontRef idx="minor">
             <a:schemeClr val="lt1"/>
@@ -6676,7 +7182,7 @@
     </p:spTree>
     <p:extLst>
       <p:ext uri="{BB962C8B-B14F-4D97-AF65-F5344CB8AC3E}">
-        <p14:creationId xmlns:p14="http://schemas.microsoft.com/office/powerpoint/2010/main" val="3774800565"/>
+        <p14:creationId xmlns:p14="http://schemas.microsoft.com/office/powerpoint/2010/main" val="2231428280"/>
       </p:ext>
     </p:extLst>
   </p:cSld>

</xml_diff>